<commit_message>
feat: PPT template field filling, editable Excel gene charts, modular package
- PPT export: TextBox 2 now fills Date, Cell line, Sample concentration,
  Positive control, Inducer, Treatment time, Test method from template
  instead of overwriting with HK/Ref/cmp summary line
- Excel export: new per-gene _Chart sheets with editable bar charts,
  custom SEM error bars, and data tables (Condition, FC, SEM, p-value)
- Extract monolith into qpcr/ package (8 modules) with parity tests
- QC: NaN-safe CV%/Z-score checks, ddct overflow clamping
- UI: step indicator, removed emojis, use_container_width migration
- Graph: <br> wrap for Plotly, dynamic legend positioning, margin tuning

Co-Authored-By: Claude Opus 4.6 <noreply@anthropic.com>
</commit_message>
<xml_diff>
--- a/251215 효능평가 결과 TEMPLATE.pptx
+++ b/251215 효능평가 결과 TEMPLATE.pptx
@@ -121,22 +121,6 @@
 <file path=ppt/changesInfos/changesInfo1.xml><?xml version="1.0" encoding="utf-8"?>
 <pc:chgInfo xmlns:a="http://schemas.openxmlformats.org/drawingml/2006/main" xmlns:r="http://schemas.openxmlformats.org/officeDocument/2006/relationships" xmlns:ac="http://schemas.microsoft.com/office/drawing/2013/main/command" xmlns:pc="http://schemas.microsoft.com/office/powerpoint/2013/main/command">
   <pc:docChgLst>
-    <pc:chgData name="김민상 (Minsang Kim) COSMAX BTI" userId="cd3abece-edaf-4c89-931c-0a39ed461b47" providerId="ADAL" clId="{8144C2A9-E0C6-4206-9A6F-1B398969A384}"/>
-    <pc:docChg chg="delSld">
-      <pc:chgData name="김민상 (Minsang Kim) COSMAX BTI" userId="cd3abece-edaf-4c89-931c-0a39ed461b47" providerId="ADAL" clId="{8144C2A9-E0C6-4206-9A6F-1B398969A384}" dt="2026-02-10T13:49:39.881" v="0" actId="47"/>
-      <pc:docMkLst>
-        <pc:docMk/>
-      </pc:docMkLst>
-      <pc:sldChg chg="del">
-        <pc:chgData name="김민상 (Minsang Kim) COSMAX BTI" userId="cd3abece-edaf-4c89-931c-0a39ed461b47" providerId="ADAL" clId="{8144C2A9-E0C6-4206-9A6F-1B398969A384}" dt="2026-02-10T13:49:39.881" v="0" actId="47"/>
-        <pc:sldMkLst>
-          <pc:docMk/>
-          <pc:sldMk cId="2840761676" sldId="445"/>
-        </pc:sldMkLst>
-      </pc:sldChg>
-    </pc:docChg>
-  </pc:docChgLst>
-  <pc:docChgLst>
     <pc:chgData name="김민상 (Minsang Kim) COSMAX BTI" userId="cd3abece-edaf-4c89-931c-0a39ed461b47" providerId="ADAL" clId="{E1371717-D3B3-4C52-A71C-323C352FE0D0}"/>
     <pc:docChg chg="undo custSel addSld modSld">
       <pc:chgData name="김민상 (Minsang Kim) COSMAX BTI" userId="cd3abece-edaf-4c89-931c-0a39ed461b47" providerId="ADAL" clId="{E1371717-D3B3-4C52-A71C-323C352FE0D0}" dt="2025-12-15T06:21:48.940" v="1492" actId="478"/>
@@ -180,6 +164,22 @@
       </pc:sldChg>
     </pc:docChg>
   </pc:docChgLst>
+  <pc:docChgLst>
+    <pc:chgData name="김민상 (Minsang Kim) COSMAX BTI" userId="cd3abece-edaf-4c89-931c-0a39ed461b47" providerId="ADAL" clId="{8144C2A9-E0C6-4206-9A6F-1B398969A384}"/>
+    <pc:docChg chg="delSld">
+      <pc:chgData name="김민상 (Minsang Kim) COSMAX BTI" userId="cd3abece-edaf-4c89-931c-0a39ed461b47" providerId="ADAL" clId="{8144C2A9-E0C6-4206-9A6F-1B398969A384}" dt="2026-02-10T13:49:39.881" v="0" actId="47"/>
+      <pc:docMkLst>
+        <pc:docMk/>
+      </pc:docMkLst>
+      <pc:sldChg chg="del">
+        <pc:chgData name="김민상 (Minsang Kim) COSMAX BTI" userId="cd3abece-edaf-4c89-931c-0a39ed461b47" providerId="ADAL" clId="{8144C2A9-E0C6-4206-9A6F-1B398969A384}" dt="2026-02-10T13:49:39.881" v="0" actId="47"/>
+        <pc:sldMkLst>
+          <pc:docMk/>
+          <pc:sldMk cId="2840761676" sldId="445"/>
+        </pc:sldMkLst>
+      </pc:sldChg>
+    </pc:docChg>
+  </pc:docChgLst>
 </pc:chgInfo>
 </file>
 
@@ -265,7 +265,7 @@
           <a:p>
             <a:fld id="{7FE8D277-8A27-4C7D-AB0F-C68E721B730D}" type="datetimeFigureOut">
               <a:rPr lang="ko-KR" altLang="en-US" smtClean="0"/>
-              <a:t>2026-02-10</a:t>
+              <a:t>2026-02-14</a:t>
             </a:fld>
             <a:endParaRPr lang="ko-KR" altLang="en-US"/>
           </a:p>
@@ -761,7 +761,7 @@
           <a:p>
             <a:fld id="{2E6AFEF9-76E3-4062-9A62-602134705C32}" type="datetimeFigureOut">
               <a:rPr lang="ko-KR" altLang="en-US" smtClean="0"/>
-              <a:t>2026-02-10</a:t>
+              <a:t>2026-02-14</a:t>
             </a:fld>
             <a:endParaRPr lang="ko-KR" altLang="en-US"/>
           </a:p>
@@ -931,7 +931,7 @@
           <a:p>
             <a:fld id="{2E6AFEF9-76E3-4062-9A62-602134705C32}" type="datetimeFigureOut">
               <a:rPr lang="ko-KR" altLang="en-US" smtClean="0"/>
-              <a:t>2026-02-10</a:t>
+              <a:t>2026-02-14</a:t>
             </a:fld>
             <a:endParaRPr lang="ko-KR" altLang="en-US"/>
           </a:p>
@@ -1111,7 +1111,7 @@
           <a:p>
             <a:fld id="{2E6AFEF9-76E3-4062-9A62-602134705C32}" type="datetimeFigureOut">
               <a:rPr lang="ko-KR" altLang="en-US" smtClean="0"/>
-              <a:t>2026-02-10</a:t>
+              <a:t>2026-02-14</a:t>
             </a:fld>
             <a:endParaRPr lang="ko-KR" altLang="en-US"/>
           </a:p>
@@ -1414,7 +1414,7 @@
           <a:p>
             <a:fld id="{2E6AFEF9-76E3-4062-9A62-602134705C32}" type="datetimeFigureOut">
               <a:rPr lang="ko-KR" altLang="en-US" smtClean="0"/>
-              <a:t>2026-02-10</a:t>
+              <a:t>2026-02-14</a:t>
             </a:fld>
             <a:endParaRPr lang="ko-KR" altLang="en-US"/>
           </a:p>
@@ -1660,7 +1660,7 @@
           <a:p>
             <a:fld id="{2E6AFEF9-76E3-4062-9A62-602134705C32}" type="datetimeFigureOut">
               <a:rPr lang="ko-KR" altLang="en-US" smtClean="0"/>
-              <a:t>2026-02-10</a:t>
+              <a:t>2026-02-14</a:t>
             </a:fld>
             <a:endParaRPr lang="ko-KR" altLang="en-US"/>
           </a:p>
@@ -1892,7 +1892,7 @@
           <a:p>
             <a:fld id="{2E6AFEF9-76E3-4062-9A62-602134705C32}" type="datetimeFigureOut">
               <a:rPr lang="ko-KR" altLang="en-US" smtClean="0"/>
-              <a:t>2026-02-10</a:t>
+              <a:t>2026-02-14</a:t>
             </a:fld>
             <a:endParaRPr lang="ko-KR" altLang="en-US"/>
           </a:p>
@@ -2259,7 +2259,7 @@
           <a:p>
             <a:fld id="{2E6AFEF9-76E3-4062-9A62-602134705C32}" type="datetimeFigureOut">
               <a:rPr lang="ko-KR" altLang="en-US" smtClean="0"/>
-              <a:t>2026-02-10</a:t>
+              <a:t>2026-02-14</a:t>
             </a:fld>
             <a:endParaRPr lang="ko-KR" altLang="en-US"/>
           </a:p>
@@ -2377,7 +2377,7 @@
           <a:p>
             <a:fld id="{2E6AFEF9-76E3-4062-9A62-602134705C32}" type="datetimeFigureOut">
               <a:rPr lang="ko-KR" altLang="en-US" smtClean="0"/>
-              <a:t>2026-02-10</a:t>
+              <a:t>2026-02-14</a:t>
             </a:fld>
             <a:endParaRPr lang="ko-KR" altLang="en-US"/>
           </a:p>
@@ -2472,7 +2472,7 @@
           <a:p>
             <a:fld id="{2E6AFEF9-76E3-4062-9A62-602134705C32}" type="datetimeFigureOut">
               <a:rPr lang="ko-KR" altLang="en-US" smtClean="0"/>
-              <a:t>2026-02-10</a:t>
+              <a:t>2026-02-14</a:t>
             </a:fld>
             <a:endParaRPr lang="ko-KR" altLang="en-US"/>
           </a:p>
@@ -2749,7 +2749,7 @@
           <a:p>
             <a:fld id="{2E6AFEF9-76E3-4062-9A62-602134705C32}" type="datetimeFigureOut">
               <a:rPr lang="ko-KR" altLang="en-US" smtClean="0"/>
-              <a:t>2026-02-10</a:t>
+              <a:t>2026-02-14</a:t>
             </a:fld>
             <a:endParaRPr lang="ko-KR" altLang="en-US"/>
           </a:p>
@@ -3006,7 +3006,7 @@
           <a:p>
             <a:fld id="{2E6AFEF9-76E3-4062-9A62-602134705C32}" type="datetimeFigureOut">
               <a:rPr lang="ko-KR" altLang="en-US" smtClean="0"/>
-              <a:t>2026-02-10</a:t>
+              <a:t>2026-02-14</a:t>
             </a:fld>
             <a:endParaRPr lang="ko-KR" altLang="en-US"/>
           </a:p>
@@ -3219,7 +3219,7 @@
           <a:p>
             <a:fld id="{2E6AFEF9-76E3-4062-9A62-602134705C32}" type="datetimeFigureOut">
               <a:rPr lang="ko-KR" altLang="en-US" smtClean="0"/>
-              <a:t>2026-02-10</a:t>
+              <a:t>2026-02-14</a:t>
             </a:fld>
             <a:endParaRPr lang="ko-KR" altLang="en-US"/>
           </a:p>
@@ -6720,8 +6720,8 @@
         </p:nvCxnSpPr>
         <p:spPr>
           <a:xfrm>
-            <a:off x="3603360" y="273588"/>
-            <a:ext cx="0" cy="1080000"/>
+            <a:off x="3600000" y="163718"/>
+            <a:ext cx="0" cy="1260000"/>
           </a:xfrm>
           <a:prstGeom prst="line">
             <a:avLst/>
@@ -6921,8 +6921,8 @@
         </p:nvSpPr>
         <p:spPr>
           <a:xfrm>
-            <a:off x="1942881" y="6032564"/>
-            <a:ext cx="8306235" cy="276999"/>
+            <a:off x="1942881" y="5948645"/>
+            <a:ext cx="8306235" cy="307777"/>
           </a:xfrm>
           <a:prstGeom prst="rect">
             <a:avLst/>
@@ -6937,28 +6937,28 @@
           <a:p>
             <a:pPr algn="ctr" eaLnBrk="1" hangingPunct="1"/>
             <a:r>
-              <a:rPr lang="en-US" altLang="ko-KR" sz="1200" b="1" dirty="0">
+              <a:rPr lang="en-US" altLang="ko-KR" sz="1400" b="1" dirty="0">
                 <a:latin typeface="Arial" panose="020B0604020202020204" pitchFamily="34" charset="0"/>
                 <a:cs typeface="Arial" panose="020B0604020202020204" pitchFamily="34" charset="0"/>
               </a:rPr>
               <a:t>Results: </a:t>
             </a:r>
             <a:r>
-              <a:rPr lang="ko-KR" altLang="en-US" sz="1200" dirty="0">
+              <a:rPr lang="ko-KR" altLang="en-US" sz="1400" dirty="0">
                 <a:latin typeface="Arial" panose="020B0604020202020204" pitchFamily="34" charset="0"/>
                 <a:cs typeface="Arial" panose="020B0604020202020204" pitchFamily="34" charset="0"/>
               </a:rPr>
               <a:t>효능 有</a:t>
             </a:r>
             <a:r>
-              <a:rPr lang="en-US" altLang="ko-KR" sz="1200" dirty="0">
+              <a:rPr lang="en-US" altLang="ko-KR" sz="1400" dirty="0">
                 <a:latin typeface="Arial" panose="020B0604020202020204" pitchFamily="34" charset="0"/>
                 <a:cs typeface="Arial" panose="020B0604020202020204" pitchFamily="34" charset="0"/>
               </a:rPr>
               <a:t>/</a:t>
             </a:r>
             <a:r>
-              <a:rPr lang="ko-KR" altLang="en-US" sz="1200" dirty="0">
+              <a:rPr lang="ko-KR" altLang="en-US" sz="1400" dirty="0">
                 <a:latin typeface="Arial" panose="020B0604020202020204" pitchFamily="34" charset="0"/>
                 <a:cs typeface="Arial" panose="020B0604020202020204" pitchFamily="34" charset="0"/>
               </a:rPr>
@@ -7011,6 +7011,145 @@
               <a:latin typeface="Arial" panose="020B0604020202020204" pitchFamily="34" charset="0"/>
               <a:cs typeface="Arial" panose="020B0604020202020204" pitchFamily="34" charset="0"/>
             </a:endParaRPr>
+          </a:p>
+        </p:txBody>
+      </p:sp>
+      <p:sp>
+        <p:nvSpPr>
+          <p:cNvPr id="3" name="TextBox 2">
+            <a:extLst>
+              <a:ext uri="{FF2B5EF4-FFF2-40B4-BE49-F238E27FC236}">
+                <a16:creationId xmlns:a16="http://schemas.microsoft.com/office/drawing/2014/main" id="{90F68BFA-39B0-8F47-913D-FC9EA52E36D6}"/>
+              </a:ext>
+            </a:extLst>
+          </p:cNvPr>
+          <p:cNvSpPr txBox="1"/>
+          <p:nvPr/>
+        </p:nvSpPr>
+        <p:spPr>
+          <a:xfrm>
+            <a:off x="3763957" y="125342"/>
+            <a:ext cx="4358029" cy="1277273"/>
+          </a:xfrm>
+          <a:prstGeom prst="rect">
+            <a:avLst/>
+          </a:prstGeom>
+          <a:noFill/>
+        </p:spPr>
+        <p:txBody>
+          <a:bodyPr wrap="square" rtlCol="0">
+            <a:spAutoFit/>
+          </a:bodyPr>
+          <a:lstStyle/>
+          <a:p>
+            <a:pPr marL="171450" indent="-171450">
+              <a:buFont typeface="Arial" panose="020B0604020202020204" pitchFamily="34" charset="0"/>
+              <a:buChar char="•"/>
+            </a:pPr>
+            <a:r>
+              <a:rPr lang="en-US" altLang="ko-KR" sz="1100" dirty="0">
+                <a:latin typeface="Arial" panose="020B0604020202020204" pitchFamily="34" charset="0"/>
+                <a:ea typeface="맑은 고딕 Semilight" panose="020B0502040204020203" pitchFamily="50" charset="-127"/>
+                <a:cs typeface="Arial" panose="020B0604020202020204" pitchFamily="34" charset="0"/>
+              </a:rPr>
+              <a:t>Date: </a:t>
+            </a:r>
+          </a:p>
+          <a:p>
+            <a:pPr marL="171450" indent="-171450">
+              <a:buFont typeface="Arial" panose="020B0604020202020204" pitchFamily="34" charset="0"/>
+              <a:buChar char="•"/>
+            </a:pPr>
+            <a:r>
+              <a:rPr lang="en-US" altLang="ko-KR" sz="1100" dirty="0">
+                <a:latin typeface="Arial" panose="020B0604020202020204" pitchFamily="34" charset="0"/>
+                <a:ea typeface="맑은 고딕 Semilight" panose="020B0502040204020203" pitchFamily="50" charset="-127"/>
+                <a:cs typeface="Arial" panose="020B0604020202020204" pitchFamily="34" charset="0"/>
+              </a:rPr>
+              <a:t>Cell line: </a:t>
+            </a:r>
+          </a:p>
+          <a:p>
+            <a:pPr marL="171450" indent="-171450">
+              <a:buFont typeface="Arial" panose="020B0604020202020204" pitchFamily="34" charset="0"/>
+              <a:buChar char="•"/>
+            </a:pPr>
+            <a:r>
+              <a:rPr lang="en-US" altLang="ko-KR" sz="1100" dirty="0">
+                <a:latin typeface="Arial" panose="020B0604020202020204" pitchFamily="34" charset="0"/>
+                <a:ea typeface="맑은 고딕 Semilight" panose="020B0502040204020203" pitchFamily="50" charset="-127"/>
+                <a:cs typeface="Arial" panose="020B0604020202020204" pitchFamily="34" charset="0"/>
+              </a:rPr>
+              <a:t>Sample concentration: </a:t>
+            </a:r>
+          </a:p>
+          <a:p>
+            <a:pPr marL="171450" indent="-171450">
+              <a:buFont typeface="Arial" panose="020B0604020202020204" pitchFamily="34" charset="0"/>
+              <a:buChar char="•"/>
+            </a:pPr>
+            <a:r>
+              <a:rPr lang="en-US" altLang="ko-KR" sz="1100" dirty="0">
+                <a:latin typeface="Arial" panose="020B0604020202020204" pitchFamily="34" charset="0"/>
+                <a:ea typeface="맑은 고딕 Semilight" panose="020B0502040204020203" pitchFamily="50" charset="-127"/>
+                <a:cs typeface="Arial" panose="020B0604020202020204" pitchFamily="34" charset="0"/>
+              </a:rPr>
+              <a:t>Positive control: </a:t>
+            </a:r>
+          </a:p>
+          <a:p>
+            <a:pPr marL="171450" indent="-171450">
+              <a:buFont typeface="Arial" panose="020B0604020202020204" pitchFamily="34" charset="0"/>
+              <a:buChar char="•"/>
+            </a:pPr>
+            <a:r>
+              <a:rPr lang="en-US" altLang="ko-KR" sz="1100" dirty="0">
+                <a:latin typeface="Arial" panose="020B0604020202020204" pitchFamily="34" charset="0"/>
+                <a:ea typeface="맑은 고딕 Semilight" panose="020B0502040204020203" pitchFamily="50" charset="-127"/>
+                <a:cs typeface="Arial" panose="020B0604020202020204" pitchFamily="34" charset="0"/>
+              </a:rPr>
+              <a:t>Inducer: </a:t>
+            </a:r>
+            <a:r>
+              <a:rPr lang="en-US" altLang="ko-KR" sz="1100" dirty="0">
+                <a:latin typeface="Arial" panose="020B0604020202020204" pitchFamily="34" charset="0"/>
+                <a:cs typeface="Arial" panose="020B0604020202020204" pitchFamily="34" charset="0"/>
+              </a:rPr>
+              <a:t> </a:t>
+            </a:r>
+            <a:endParaRPr lang="en-US" altLang="ko-KR" sz="1100" dirty="0">
+              <a:latin typeface="Arial" panose="020B0604020202020204" pitchFamily="34" charset="0"/>
+              <a:ea typeface="맑은 고딕 Semilight" panose="020B0502040204020203" pitchFamily="50" charset="-127"/>
+              <a:cs typeface="Arial" panose="020B0604020202020204" pitchFamily="34" charset="0"/>
+            </a:endParaRPr>
+          </a:p>
+          <a:p>
+            <a:pPr marL="171450" indent="-171450">
+              <a:buFont typeface="Arial" panose="020B0604020202020204" pitchFamily="34" charset="0"/>
+              <a:buChar char="•"/>
+            </a:pPr>
+            <a:r>
+              <a:rPr lang="en-US" altLang="ko-KR" sz="1100" dirty="0">
+                <a:latin typeface="Arial" panose="020B0604020202020204" pitchFamily="34" charset="0"/>
+                <a:ea typeface="맑은 고딕 Semilight" panose="020B0502040204020203" pitchFamily="50" charset="-127"/>
+                <a:cs typeface="Arial" panose="020B0604020202020204" pitchFamily="34" charset="0"/>
+              </a:rPr>
+              <a:t>Treatment time: </a:t>
+            </a:r>
+          </a:p>
+          <a:p>
+            <a:pPr marL="171450" indent="-171450">
+              <a:buFont typeface="Arial" panose="020B0604020202020204" pitchFamily="34" charset="0"/>
+              <a:buChar char="•"/>
+            </a:pPr>
+            <a:r>
+              <a:rPr lang="en-US" altLang="ko-KR" sz="1100" dirty="0">
+                <a:latin typeface="Arial" panose="020B0604020202020204" pitchFamily="34" charset="0"/>
+                <a:ea typeface="맑은 고딕 Semilight" panose="020B0502040204020203" pitchFamily="50" charset="-127"/>
+                <a:cs typeface="Arial" panose="020B0604020202020204" pitchFamily="34" charset="0"/>
+              </a:rPr>
+              <a:t>Test method:</a:t>
+            </a:r>
           </a:p>
         </p:txBody>
       </p:sp>

</xml_diff>